<commit_message>
Corrections and comments by Jean-Philippe
</commit_message>
<xml_diff>
--- a/papier/odsi_wp1wp3/figures/Flows.pptx
+++ b/papier/odsi_wp1wp3/figures/Flows.pptx
@@ -250,7 +250,7 @@
           <a:p>
             <a:fld id="{7E66C8CA-D80F-4CE4-9EA3-5A60F3F6014D}" type="datetimeFigureOut">
               <a:rPr lang="fr-FR" smtClean="0"/>
-              <a:t>22/03/2018</a:t>
+              <a:t>25/03/2018</a:t>
             </a:fld>
             <a:endParaRPr lang="fr-FR"/>
           </a:p>
@@ -420,7 +420,7 @@
             <a:fld id="{14F63557-65CD-470F-8999-4C3C411BE899}" type="datetimeFigureOut">
               <a:rPr lang="en-GB" smtClean="0"/>
               <a:pPr/>
-              <a:t>22/03/2018</a:t>
+              <a:t>25/03/2018</a:t>
             </a:fld>
             <a:endParaRPr lang="en-GB"/>
           </a:p>
@@ -4822,106 +4822,6 @@
           </a:p>
         </p:txBody>
       </p:sp>
-      <p:sp>
-        <p:nvSpPr>
-          <p:cNvPr id="45" name="Rectangle 44"/>
-          <p:cNvSpPr/>
-          <p:nvPr/>
-        </p:nvSpPr>
-        <p:spPr>
-          <a:xfrm>
-            <a:off x="4727978" y="1374187"/>
-            <a:ext cx="1783675" cy="576000"/>
-          </a:xfrm>
-          <a:prstGeom prst="rect">
-            <a:avLst/>
-          </a:prstGeom>
-          <a:noFill/>
-          <a:ln>
-            <a:solidFill>
-              <a:srgbClr val="000000"/>
-            </a:solidFill>
-          </a:ln>
-        </p:spPr>
-        <p:style>
-          <a:lnRef idx="2">
-            <a:schemeClr val="accent3">
-              <a:shade val="50000"/>
-            </a:schemeClr>
-          </a:lnRef>
-          <a:fillRef idx="1">
-            <a:schemeClr val="accent3"/>
-          </a:fillRef>
-          <a:effectRef idx="0">
-            <a:schemeClr val="accent3"/>
-          </a:effectRef>
-          <a:fontRef idx="minor">
-            <a:schemeClr val="lt1"/>
-          </a:fontRef>
-        </p:style>
-        <p:txBody>
-          <a:bodyPr rtlCol="0" anchor="ctr"/>
-          <a:lstStyle/>
-          <a:p>
-            <a:pPr algn="ctr"/>
-            <a:r>
-              <a:rPr lang="fr-FR" sz="1200" dirty="0" smtClean="0">
-                <a:solidFill>
-                  <a:srgbClr val="000000"/>
-                </a:solidFill>
-                <a:latin typeface="CMU Sans Serif" panose="02000603000000000000" pitchFamily="2" charset="0"/>
-                <a:ea typeface="CMU Sans Serif" panose="02000603000000000000" pitchFamily="2" charset="0"/>
-                <a:cs typeface="CMU Sans Serif" panose="02000603000000000000" pitchFamily="2" charset="0"/>
-              </a:rPr>
-              <a:t>Virtual </a:t>
-            </a:r>
-            <a:r>
-              <a:rPr lang="fr-FR" sz="1200" dirty="0" err="1" smtClean="0">
-                <a:solidFill>
-                  <a:srgbClr val="000000"/>
-                </a:solidFill>
-                <a:latin typeface="CMU Sans Serif" panose="02000603000000000000" pitchFamily="2" charset="0"/>
-                <a:ea typeface="CMU Sans Serif" panose="02000603000000000000" pitchFamily="2" charset="0"/>
-                <a:cs typeface="CMU Sans Serif" panose="02000603000000000000" pitchFamily="2" charset="0"/>
-              </a:rPr>
-              <a:t>sensor</a:t>
-            </a:r>
-            <a:r>
-              <a:rPr lang="fr-FR" sz="1200" dirty="0" smtClean="0">
-                <a:solidFill>
-                  <a:srgbClr val="000000"/>
-                </a:solidFill>
-                <a:latin typeface="CMU Sans Serif" panose="02000603000000000000" pitchFamily="2" charset="0"/>
-                <a:ea typeface="CMU Sans Serif" panose="02000603000000000000" pitchFamily="2" charset="0"/>
-                <a:cs typeface="CMU Sans Serif" panose="02000603000000000000" pitchFamily="2" charset="0"/>
-              </a:rPr>
-              <a:t> manager / Virtual </a:t>
-            </a:r>
-            <a:r>
-              <a:rPr lang="fr-FR" sz="1200" dirty="0" err="1" smtClean="0">
-                <a:solidFill>
-                  <a:srgbClr val="000000"/>
-                </a:solidFill>
-                <a:latin typeface="CMU Sans Serif" panose="02000603000000000000" pitchFamily="2" charset="0"/>
-                <a:ea typeface="CMU Sans Serif" panose="02000603000000000000" pitchFamily="2" charset="0"/>
-                <a:cs typeface="CMU Sans Serif" panose="02000603000000000000" pitchFamily="2" charset="0"/>
-              </a:rPr>
-              <a:t>actuator</a:t>
-            </a:r>
-            <a:r>
-              <a:rPr lang="fr-FR" sz="1200" dirty="0" smtClean="0">
-                <a:solidFill>
-                  <a:srgbClr val="000000"/>
-                </a:solidFill>
-                <a:latin typeface="CMU Sans Serif" panose="02000603000000000000" pitchFamily="2" charset="0"/>
-                <a:ea typeface="CMU Sans Serif" panose="02000603000000000000" pitchFamily="2" charset="0"/>
-                <a:cs typeface="CMU Sans Serif" panose="02000603000000000000" pitchFamily="2" charset="0"/>
-              </a:rPr>
-              <a:t> manager</a:t>
-            </a:r>
-          </a:p>
-        </p:txBody>
-      </p:sp>
       <p:grpSp>
         <p:nvGrpSpPr>
           <p:cNvPr id="3" name="Groupe 2"/>
@@ -5395,11 +5295,6 @@
               </a:rPr>
               <a:t>Command</a:t>
             </a:r>
-            <a:endParaRPr lang="fr-FR" sz="1100" dirty="0" smtClean="0">
-              <a:latin typeface="CMU Sans Serif" panose="02000603000000000000" pitchFamily="2" charset="0"/>
-              <a:ea typeface="CMU Sans Serif" panose="02000603000000000000" pitchFamily="2" charset="0"/>
-              <a:cs typeface="CMU Sans Serif" panose="02000603000000000000" pitchFamily="2" charset="0"/>
-            </a:endParaRPr>
           </a:p>
         </p:txBody>
       </p:sp>
@@ -5431,15 +5326,7 @@
                 <a:ea typeface="CMU Sans Serif" panose="02000603000000000000" pitchFamily="2" charset="0"/>
                 <a:cs typeface="CMU Sans Serif" panose="02000603000000000000" pitchFamily="2" charset="0"/>
               </a:rPr>
-              <a:t>2) Command </a:t>
-            </a:r>
-            <a:r>
-              <a:rPr lang="fr-FR" sz="1100" dirty="0" smtClean="0">
-                <a:latin typeface="CMU Sans Serif" panose="02000603000000000000" pitchFamily="2" charset="0"/>
-                <a:ea typeface="CMU Sans Serif" panose="02000603000000000000" pitchFamily="2" charset="0"/>
-                <a:cs typeface="CMU Sans Serif" panose="02000603000000000000" pitchFamily="2" charset="0"/>
-              </a:rPr>
-              <a:t>&amp; </a:t>
+              <a:t>2) Command &amp; </a:t>
             </a:r>
             <a:r>
               <a:rPr lang="fr-FR" sz="1100" dirty="0" err="1" smtClean="0">
@@ -6759,15 +6646,7 @@
               <a:avLst/>
             </a:prstGeom>
             <a:grpFill/>
-            <a:extLst>
-              <a:ext uri="{909E8E84-426E-40DD-AFC4-6F175D3DCCD1}">
-                <a14:hiddenFill xmlns:a14="http://schemas.microsoft.com/office/drawing/2010/main">
-                  <a:solidFill>
-                    <a:srgbClr val="FFFFFF"/>
-                  </a:solidFill>
-                </a14:hiddenFill>
-              </a:ext>
-            </a:extLst>
+            <a:extLst/>
           </p:spPr>
         </p:pic>
       </p:grpSp>
@@ -6911,13 +6790,6 @@
               <a:noFill/>
             </a:ln>
             <a:extLst>
-              <a:ext uri="{909E8E84-426E-40DD-AFC4-6F175D3DCCD1}">
-                <a14:hiddenFill xmlns:a14="http://schemas.microsoft.com/office/drawing/2010/main">
-                  <a:solidFill>
-                    <a:schemeClr val="accent1"/>
-                  </a:solidFill>
-                </a14:hiddenFill>
-              </a:ext>
               <a:ext uri="{91240B29-F687-4F45-9708-019B960494DF}">
                 <a14:hiddenLine xmlns:a14="http://schemas.microsoft.com/office/drawing/2010/main" w="9525">
                   <a:solidFill>
@@ -7004,14 +6876,6 @@
                 </a:rPr>
                 <a:t>PDP</a:t>
               </a:r>
-              <a:endParaRPr lang="fr-FR" sz="1200" dirty="0" smtClean="0">
-                <a:solidFill>
-                  <a:srgbClr val="000000"/>
-                </a:solidFill>
-                <a:latin typeface="CMU Sans Serif" panose="02000603000000000000" pitchFamily="2" charset="0"/>
-                <a:ea typeface="CMU Sans Serif" panose="02000603000000000000" pitchFamily="2" charset="0"/>
-                <a:cs typeface="CMU Sans Serif" panose="02000603000000000000" pitchFamily="2" charset="0"/>
-              </a:endParaRPr>
             </a:p>
           </p:txBody>
         </p:sp>
@@ -7045,15 +6909,7 @@
               <a:avLst/>
             </a:prstGeom>
             <a:grpFill/>
-            <a:extLst>
-              <a:ext uri="{909E8E84-426E-40DD-AFC4-6F175D3DCCD1}">
-                <a14:hiddenFill xmlns:a14="http://schemas.microsoft.com/office/drawing/2010/main">
-                  <a:solidFill>
-                    <a:srgbClr val="FFFFFF"/>
-                  </a:solidFill>
-                </a14:hiddenFill>
-              </a:ext>
-            </a:extLst>
+            <a:extLst/>
           </p:spPr>
         </p:pic>
       </p:grpSp>
@@ -7170,15 +7026,7 @@
               <a:avLst/>
             </a:prstGeom>
             <a:grpFill/>
-            <a:extLst>
-              <a:ext uri="{909E8E84-426E-40DD-AFC4-6F175D3DCCD1}">
-                <a14:hiddenFill xmlns:a14="http://schemas.microsoft.com/office/drawing/2010/main">
-                  <a:solidFill>
-                    <a:srgbClr val="FFFFFF"/>
-                  </a:solidFill>
-                </a14:hiddenFill>
-              </a:ext>
-            </a:extLst>
+            <a:extLst/>
           </p:spPr>
         </p:pic>
       </p:grpSp>
@@ -7322,13 +7170,6 @@
               <a:noFill/>
             </a:ln>
             <a:extLst>
-              <a:ext uri="{909E8E84-426E-40DD-AFC4-6F175D3DCCD1}">
-                <a14:hiddenFill xmlns:a14="http://schemas.microsoft.com/office/drawing/2010/main">
-                  <a:solidFill>
-                    <a:schemeClr val="accent1"/>
-                  </a:solidFill>
-                </a14:hiddenFill>
-              </a:ext>
               <a:ext uri="{91240B29-F687-4F45-9708-019B960494DF}">
                 <a14:hiddenLine xmlns:a14="http://schemas.microsoft.com/office/drawing/2010/main" w="9525">
                   <a:solidFill>
@@ -7415,14 +7256,6 @@
                 </a:rPr>
                 <a:t>PDP</a:t>
               </a:r>
-              <a:endParaRPr lang="fr-FR" sz="1200" dirty="0" smtClean="0">
-                <a:solidFill>
-                  <a:srgbClr val="000000"/>
-                </a:solidFill>
-                <a:latin typeface="CMU Sans Serif" panose="02000603000000000000" pitchFamily="2" charset="0"/>
-                <a:ea typeface="CMU Sans Serif" panose="02000603000000000000" pitchFamily="2" charset="0"/>
-                <a:cs typeface="CMU Sans Serif" panose="02000603000000000000" pitchFamily="2" charset="0"/>
-              </a:endParaRPr>
             </a:p>
           </p:txBody>
         </p:sp>
@@ -7456,15 +7289,7 @@
               <a:avLst/>
             </a:prstGeom>
             <a:grpFill/>
-            <a:extLst>
-              <a:ext uri="{909E8E84-426E-40DD-AFC4-6F175D3DCCD1}">
-                <a14:hiddenFill xmlns:a14="http://schemas.microsoft.com/office/drawing/2010/main">
-                  <a:solidFill>
-                    <a:srgbClr val="FFFFFF"/>
-                  </a:solidFill>
-                </a14:hiddenFill>
-              </a:ext>
-            </a:extLst>
+            <a:extLst/>
           </p:spPr>
         </p:pic>
       </p:grpSp>
@@ -7581,15 +7406,7 @@
               <a:avLst/>
             </a:prstGeom>
             <a:grpFill/>
-            <a:extLst>
-              <a:ext uri="{909E8E84-426E-40DD-AFC4-6F175D3DCCD1}">
-                <a14:hiddenFill xmlns:a14="http://schemas.microsoft.com/office/drawing/2010/main">
-                  <a:solidFill>
-                    <a:srgbClr val="FFFFFF"/>
-                  </a:solidFill>
-                </a14:hiddenFill>
-              </a:ext>
-            </a:extLst>
+            <a:extLst/>
           </p:spPr>
         </p:pic>
       </p:grpSp>
@@ -7739,15 +7556,7 @@
               <a:avLst/>
             </a:prstGeom>
             <a:grpFill/>
-            <a:extLst>
-              <a:ext uri="{909E8E84-426E-40DD-AFC4-6F175D3DCCD1}">
-                <a14:hiddenFill xmlns:a14="http://schemas.microsoft.com/office/drawing/2010/main">
-                  <a:solidFill>
-                    <a:srgbClr val="FFFFFF"/>
-                  </a:solidFill>
-                </a14:hiddenFill>
-              </a:ext>
-            </a:extLst>
+            <a:extLst/>
           </p:spPr>
         </p:pic>
       </p:grpSp>
@@ -7847,6 +7656,195 @@
               <a:ea typeface="CMU Sans Serif" panose="02000603000000000000" pitchFamily="2" charset="0"/>
               <a:cs typeface="CMU Sans Serif" panose="02000603000000000000" pitchFamily="2" charset="0"/>
             </a:endParaRPr>
+          </a:p>
+        </p:txBody>
+      </p:sp>
+      <p:sp>
+        <p:nvSpPr>
+          <p:cNvPr id="60" name="Rectangle 59"/>
+          <p:cNvSpPr/>
+          <p:nvPr/>
+        </p:nvSpPr>
+        <p:spPr>
+          <a:xfrm>
+            <a:off x="4751186" y="1771301"/>
+            <a:ext cx="1783675" cy="460652"/>
+          </a:xfrm>
+          <a:prstGeom prst="rect">
+            <a:avLst/>
+          </a:prstGeom>
+          <a:noFill/>
+          <a:ln>
+            <a:solidFill>
+              <a:srgbClr val="000000"/>
+            </a:solidFill>
+          </a:ln>
+        </p:spPr>
+        <p:style>
+          <a:lnRef idx="2">
+            <a:schemeClr val="accent3">
+              <a:shade val="50000"/>
+            </a:schemeClr>
+          </a:lnRef>
+          <a:fillRef idx="1">
+            <a:schemeClr val="accent3"/>
+          </a:fillRef>
+          <a:effectRef idx="0">
+            <a:schemeClr val="accent3"/>
+          </a:effectRef>
+          <a:fontRef idx="minor">
+            <a:schemeClr val="lt1"/>
+          </a:fontRef>
+        </p:style>
+        <p:txBody>
+          <a:bodyPr rtlCol="0" anchor="ctr"/>
+          <a:lstStyle/>
+          <a:p>
+            <a:pPr algn="ctr"/>
+            <a:r>
+              <a:rPr lang="fr-FR" sz="1200" dirty="0" smtClean="0">
+                <a:solidFill>
+                  <a:srgbClr val="000000"/>
+                </a:solidFill>
+                <a:latin typeface="CMU Sans Serif" panose="02000603000000000000" pitchFamily="2" charset="0"/>
+                <a:ea typeface="CMU Sans Serif" panose="02000603000000000000" pitchFamily="2" charset="0"/>
+                <a:cs typeface="CMU Sans Serif" panose="02000603000000000000" pitchFamily="2" charset="0"/>
+              </a:rPr>
+              <a:t>Virtual </a:t>
+            </a:r>
+            <a:r>
+              <a:rPr lang="fr-FR" sz="1200" dirty="0" err="1" smtClean="0">
+                <a:solidFill>
+                  <a:srgbClr val="000000"/>
+                </a:solidFill>
+                <a:latin typeface="CMU Sans Serif" panose="02000603000000000000" pitchFamily="2" charset="0"/>
+                <a:ea typeface="CMU Sans Serif" panose="02000603000000000000" pitchFamily="2" charset="0"/>
+                <a:cs typeface="CMU Sans Serif" panose="02000603000000000000" pitchFamily="2" charset="0"/>
+              </a:rPr>
+              <a:t>sensor</a:t>
+            </a:r>
+            <a:r>
+              <a:rPr lang="fr-FR" sz="1200" dirty="0" smtClean="0">
+                <a:solidFill>
+                  <a:srgbClr val="000000"/>
+                </a:solidFill>
+                <a:latin typeface="CMU Sans Serif" panose="02000603000000000000" pitchFamily="2" charset="0"/>
+                <a:ea typeface="CMU Sans Serif" panose="02000603000000000000" pitchFamily="2" charset="0"/>
+                <a:cs typeface="CMU Sans Serif" panose="02000603000000000000" pitchFamily="2" charset="0"/>
+              </a:rPr>
+              <a:t> / </a:t>
+            </a:r>
+            <a:r>
+              <a:rPr lang="fr-FR" sz="1200" dirty="0" err="1" smtClean="0">
+                <a:solidFill>
+                  <a:srgbClr val="000000"/>
+                </a:solidFill>
+                <a:latin typeface="CMU Sans Serif" panose="02000603000000000000" pitchFamily="2" charset="0"/>
+                <a:ea typeface="CMU Sans Serif" panose="02000603000000000000" pitchFamily="2" charset="0"/>
+                <a:cs typeface="CMU Sans Serif" panose="02000603000000000000" pitchFamily="2" charset="0"/>
+              </a:rPr>
+              <a:t>actuator</a:t>
+            </a:r>
+            <a:r>
+              <a:rPr lang="fr-FR" sz="1200" dirty="0" smtClean="0">
+                <a:solidFill>
+                  <a:srgbClr val="000000"/>
+                </a:solidFill>
+                <a:latin typeface="CMU Sans Serif" panose="02000603000000000000" pitchFamily="2" charset="0"/>
+                <a:ea typeface="CMU Sans Serif" panose="02000603000000000000" pitchFamily="2" charset="0"/>
+                <a:cs typeface="CMU Sans Serif" panose="02000603000000000000" pitchFamily="2" charset="0"/>
+              </a:rPr>
+              <a:t> manager</a:t>
+            </a:r>
+          </a:p>
+        </p:txBody>
+      </p:sp>
+      <p:sp>
+        <p:nvSpPr>
+          <p:cNvPr id="61" name="Rectangle 60"/>
+          <p:cNvSpPr/>
+          <p:nvPr/>
+        </p:nvSpPr>
+        <p:spPr>
+          <a:xfrm>
+            <a:off x="4744516" y="1067924"/>
+            <a:ext cx="1783675" cy="440953"/>
+          </a:xfrm>
+          <a:prstGeom prst="rect">
+            <a:avLst/>
+          </a:prstGeom>
+          <a:noFill/>
+          <a:ln>
+            <a:solidFill>
+              <a:srgbClr val="000000"/>
+            </a:solidFill>
+          </a:ln>
+        </p:spPr>
+        <p:style>
+          <a:lnRef idx="2">
+            <a:schemeClr val="accent3">
+              <a:shade val="50000"/>
+            </a:schemeClr>
+          </a:lnRef>
+          <a:fillRef idx="1">
+            <a:schemeClr val="accent3"/>
+          </a:fillRef>
+          <a:effectRef idx="0">
+            <a:schemeClr val="accent3"/>
+          </a:effectRef>
+          <a:fontRef idx="minor">
+            <a:schemeClr val="lt1"/>
+          </a:fontRef>
+        </p:style>
+        <p:txBody>
+          <a:bodyPr rtlCol="0" anchor="ctr"/>
+          <a:lstStyle/>
+          <a:p>
+            <a:pPr algn="ctr"/>
+            <a:r>
+              <a:rPr lang="fr-FR" sz="1200" dirty="0" err="1" smtClean="0">
+                <a:solidFill>
+                  <a:srgbClr val="000000"/>
+                </a:solidFill>
+                <a:latin typeface="CMU Sans Serif" panose="02000603000000000000" pitchFamily="2" charset="0"/>
+                <a:ea typeface="CMU Sans Serif" panose="02000603000000000000" pitchFamily="2" charset="0"/>
+                <a:cs typeface="CMU Sans Serif" panose="02000603000000000000" pitchFamily="2" charset="0"/>
+              </a:rPr>
+              <a:t>Sensor</a:t>
+            </a:r>
+            <a:r>
+              <a:rPr lang="fr-FR" sz="1200" dirty="0" smtClean="0">
+                <a:solidFill>
+                  <a:srgbClr val="000000"/>
+                </a:solidFill>
+                <a:latin typeface="CMU Sans Serif" panose="02000603000000000000" pitchFamily="2" charset="0"/>
+                <a:ea typeface="CMU Sans Serif" panose="02000603000000000000" pitchFamily="2" charset="0"/>
+                <a:cs typeface="CMU Sans Serif" panose="02000603000000000000" pitchFamily="2" charset="0"/>
+              </a:rPr>
+              <a:t> / </a:t>
+            </a:r>
+            <a:r>
+              <a:rPr lang="fr-FR" sz="1200" dirty="0" err="1" smtClean="0">
+                <a:solidFill>
+                  <a:srgbClr val="000000"/>
+                </a:solidFill>
+                <a:latin typeface="CMU Sans Serif" panose="02000603000000000000" pitchFamily="2" charset="0"/>
+                <a:ea typeface="CMU Sans Serif" panose="02000603000000000000" pitchFamily="2" charset="0"/>
+                <a:cs typeface="CMU Sans Serif" panose="02000603000000000000" pitchFamily="2" charset="0"/>
+              </a:rPr>
+              <a:t>Actuator</a:t>
+            </a:r>
+            <a:r>
+              <a:rPr lang="fr-FR" sz="1200" dirty="0" smtClean="0">
+                <a:solidFill>
+                  <a:srgbClr val="000000"/>
+                </a:solidFill>
+                <a:latin typeface="CMU Sans Serif" panose="02000603000000000000" pitchFamily="2" charset="0"/>
+                <a:ea typeface="CMU Sans Serif" panose="02000603000000000000" pitchFamily="2" charset="0"/>
+                <a:cs typeface="CMU Sans Serif" panose="02000603000000000000" pitchFamily="2" charset="0"/>
+              </a:rPr>
+              <a:t> driver</a:t>
+            </a:r>
           </a:p>
         </p:txBody>
       </p:sp>
@@ -10549,15 +10547,7 @@
               <a:avLst/>
             </a:prstGeom>
             <a:grpFill/>
-            <a:extLst>
-              <a:ext uri="{909E8E84-426E-40DD-AFC4-6F175D3DCCD1}">
-                <a14:hiddenFill xmlns:a14="http://schemas.microsoft.com/office/drawing/2010/main">
-                  <a:solidFill>
-                    <a:srgbClr val="FFFFFF"/>
-                  </a:solidFill>
-                </a14:hiddenFill>
-              </a:ext>
-            </a:extLst>
+            <a:extLst/>
           </p:spPr>
         </p:pic>
       </p:grpSp>
@@ -10701,13 +10691,6 @@
               <a:noFill/>
             </a:ln>
             <a:extLst>
-              <a:ext uri="{909E8E84-426E-40DD-AFC4-6F175D3DCCD1}">
-                <a14:hiddenFill xmlns:a14="http://schemas.microsoft.com/office/drawing/2010/main">
-                  <a:solidFill>
-                    <a:schemeClr val="accent1"/>
-                  </a:solidFill>
-                </a14:hiddenFill>
-              </a:ext>
               <a:ext uri="{91240B29-F687-4F45-9708-019B960494DF}">
                 <a14:hiddenLine xmlns:a14="http://schemas.microsoft.com/office/drawing/2010/main" w="9525">
                   <a:solidFill>
@@ -10794,14 +10777,6 @@
                 </a:rPr>
                 <a:t>PDP</a:t>
               </a:r>
-              <a:endParaRPr lang="fr-FR" sz="1200" dirty="0" smtClean="0">
-                <a:solidFill>
-                  <a:srgbClr val="000000"/>
-                </a:solidFill>
-                <a:latin typeface="CMU Sans Serif" panose="02000603000000000000" pitchFamily="2" charset="0"/>
-                <a:ea typeface="CMU Sans Serif" panose="02000603000000000000" pitchFamily="2" charset="0"/>
-                <a:cs typeface="CMU Sans Serif" panose="02000603000000000000" pitchFamily="2" charset="0"/>
-              </a:endParaRPr>
             </a:p>
           </p:txBody>
         </p:sp>
@@ -10835,15 +10810,7 @@
               <a:avLst/>
             </a:prstGeom>
             <a:grpFill/>
-            <a:extLst>
-              <a:ext uri="{909E8E84-426E-40DD-AFC4-6F175D3DCCD1}">
-                <a14:hiddenFill xmlns:a14="http://schemas.microsoft.com/office/drawing/2010/main">
-                  <a:solidFill>
-                    <a:srgbClr val="FFFFFF"/>
-                  </a:solidFill>
-                </a14:hiddenFill>
-              </a:ext>
-            </a:extLst>
+            <a:extLst/>
           </p:spPr>
         </p:pic>
       </p:grpSp>
@@ -10960,15 +10927,7 @@
               <a:avLst/>
             </a:prstGeom>
             <a:grpFill/>
-            <a:extLst>
-              <a:ext uri="{909E8E84-426E-40DD-AFC4-6F175D3DCCD1}">
-                <a14:hiddenFill xmlns:a14="http://schemas.microsoft.com/office/drawing/2010/main">
-                  <a:solidFill>
-                    <a:srgbClr val="FFFFFF"/>
-                  </a:solidFill>
-                </a14:hiddenFill>
-              </a:ext>
-            </a:extLst>
+            <a:extLst/>
           </p:spPr>
         </p:pic>
       </p:grpSp>
@@ -11379,14 +11338,6 @@
                 </a:rPr>
                 <a:t>PEP</a:t>
               </a:r>
-              <a:endParaRPr lang="fr-FR" sz="1200" dirty="0" smtClean="0">
-                <a:solidFill>
-                  <a:srgbClr val="000000"/>
-                </a:solidFill>
-                <a:latin typeface="CMU Sans Serif" panose="02000603000000000000" pitchFamily="2" charset="0"/>
-                <a:ea typeface="CMU Sans Serif" panose="02000603000000000000" pitchFamily="2" charset="0"/>
-                <a:cs typeface="CMU Sans Serif" panose="02000603000000000000" pitchFamily="2" charset="0"/>
-              </a:endParaRPr>
             </a:p>
           </p:txBody>
         </p:sp>
@@ -11420,15 +11371,7 @@
               <a:avLst/>
             </a:prstGeom>
             <a:grpFill/>
-            <a:extLst>
-              <a:ext uri="{909E8E84-426E-40DD-AFC4-6F175D3DCCD1}">
-                <a14:hiddenFill xmlns:a14="http://schemas.microsoft.com/office/drawing/2010/main">
-                  <a:solidFill>
-                    <a:srgbClr val="FFFFFF"/>
-                  </a:solidFill>
-                </a14:hiddenFill>
-              </a:ext>
-            </a:extLst>
+            <a:extLst/>
           </p:spPr>
         </p:pic>
       </p:grpSp>
@@ -11572,13 +11515,6 @@
               <a:noFill/>
             </a:ln>
             <a:extLst>
-              <a:ext uri="{909E8E84-426E-40DD-AFC4-6F175D3DCCD1}">
-                <a14:hiddenFill xmlns:a14="http://schemas.microsoft.com/office/drawing/2010/main">
-                  <a:solidFill>
-                    <a:schemeClr val="accent1"/>
-                  </a:solidFill>
-                </a14:hiddenFill>
-              </a:ext>
               <a:ext uri="{91240B29-F687-4F45-9708-019B960494DF}">
                 <a14:hiddenLine xmlns:a14="http://schemas.microsoft.com/office/drawing/2010/main" w="9525">
                   <a:solidFill>
@@ -11665,14 +11601,6 @@
                 </a:rPr>
                 <a:t>PDP</a:t>
               </a:r>
-              <a:endParaRPr lang="fr-FR" sz="1200" dirty="0" smtClean="0">
-                <a:solidFill>
-                  <a:srgbClr val="000000"/>
-                </a:solidFill>
-                <a:latin typeface="CMU Sans Serif" panose="02000603000000000000" pitchFamily="2" charset="0"/>
-                <a:ea typeface="CMU Sans Serif" panose="02000603000000000000" pitchFamily="2" charset="0"/>
-                <a:cs typeface="CMU Sans Serif" panose="02000603000000000000" pitchFamily="2" charset="0"/>
-              </a:endParaRPr>
             </a:p>
           </p:txBody>
         </p:sp>
@@ -11706,15 +11634,7 @@
               <a:avLst/>
             </a:prstGeom>
             <a:grpFill/>
-            <a:extLst>
-              <a:ext uri="{909E8E84-426E-40DD-AFC4-6F175D3DCCD1}">
-                <a14:hiddenFill xmlns:a14="http://schemas.microsoft.com/office/drawing/2010/main">
-                  <a:solidFill>
-                    <a:srgbClr val="FFFFFF"/>
-                  </a:solidFill>
-                </a14:hiddenFill>
-              </a:ext>
-            </a:extLst>
+            <a:extLst/>
           </p:spPr>
         </p:pic>
       </p:grpSp>
@@ -11831,15 +11751,7 @@
               <a:avLst/>
             </a:prstGeom>
             <a:grpFill/>
-            <a:extLst>
-              <a:ext uri="{909E8E84-426E-40DD-AFC4-6F175D3DCCD1}">
-                <a14:hiddenFill xmlns:a14="http://schemas.microsoft.com/office/drawing/2010/main">
-                  <a:solidFill>
-                    <a:srgbClr val="FFFFFF"/>
-                  </a:solidFill>
-                </a14:hiddenFill>
-              </a:ext>
-            </a:extLst>
+            <a:extLst/>
           </p:spPr>
         </p:pic>
       </p:grpSp>

</xml_diff>